<commit_message>
road map status added
</commit_message>
<xml_diff>
--- a/ROADMAP/roadmap html.pptx
+++ b/ROADMAP/roadmap html.pptx
@@ -105,6 +105,11 @@
       </a:defRPr>
     </a:lvl9pPr>
   </p:defaultTextStyle>
+  <p:extLst>
+    <p:ext uri="{EFAFB233-063F-42B5-8137-9DF3F51BA10A}">
+      <p15:sldGuideLst xmlns:p15="http://schemas.microsoft.com/office/powerpoint/2012/main"/>
+    </p:ext>
+  </p:extLst>
 </p:presentation>
 </file>
 
@@ -257,7 +262,7 @@
           <a:p>
             <a:fld id="{3757B9D6-B1DD-42FC-8CF6-CEEED335747B}" type="datetimeFigureOut">
               <a:rPr lang="en-IN" smtClean="0"/>
-              <a:t>08-09-2025</a:t>
+              <a:t>09-09-2025</a:t>
             </a:fld>
             <a:endParaRPr lang="en-IN"/>
           </a:p>
@@ -457,7 +462,7 @@
           <a:p>
             <a:fld id="{3757B9D6-B1DD-42FC-8CF6-CEEED335747B}" type="datetimeFigureOut">
               <a:rPr lang="en-IN" smtClean="0"/>
-              <a:t>08-09-2025</a:t>
+              <a:t>09-09-2025</a:t>
             </a:fld>
             <a:endParaRPr lang="en-IN"/>
           </a:p>
@@ -667,7 +672,7 @@
           <a:p>
             <a:fld id="{3757B9D6-B1DD-42FC-8CF6-CEEED335747B}" type="datetimeFigureOut">
               <a:rPr lang="en-IN" smtClean="0"/>
-              <a:t>08-09-2025</a:t>
+              <a:t>09-09-2025</a:t>
             </a:fld>
             <a:endParaRPr lang="en-IN"/>
           </a:p>
@@ -867,7 +872,7 @@
           <a:p>
             <a:fld id="{3757B9D6-B1DD-42FC-8CF6-CEEED335747B}" type="datetimeFigureOut">
               <a:rPr lang="en-IN" smtClean="0"/>
-              <a:t>08-09-2025</a:t>
+              <a:t>09-09-2025</a:t>
             </a:fld>
             <a:endParaRPr lang="en-IN"/>
           </a:p>
@@ -1143,7 +1148,7 @@
           <a:p>
             <a:fld id="{3757B9D6-B1DD-42FC-8CF6-CEEED335747B}" type="datetimeFigureOut">
               <a:rPr lang="en-IN" smtClean="0"/>
-              <a:t>08-09-2025</a:t>
+              <a:t>09-09-2025</a:t>
             </a:fld>
             <a:endParaRPr lang="en-IN"/>
           </a:p>
@@ -1411,7 +1416,7 @@
           <a:p>
             <a:fld id="{3757B9D6-B1DD-42FC-8CF6-CEEED335747B}" type="datetimeFigureOut">
               <a:rPr lang="en-IN" smtClean="0"/>
-              <a:t>08-09-2025</a:t>
+              <a:t>09-09-2025</a:t>
             </a:fld>
             <a:endParaRPr lang="en-IN"/>
           </a:p>
@@ -1826,7 +1831,7 @@
           <a:p>
             <a:fld id="{3757B9D6-B1DD-42FC-8CF6-CEEED335747B}" type="datetimeFigureOut">
               <a:rPr lang="en-IN" smtClean="0"/>
-              <a:t>08-09-2025</a:t>
+              <a:t>09-09-2025</a:t>
             </a:fld>
             <a:endParaRPr lang="en-IN"/>
           </a:p>
@@ -1968,7 +1973,7 @@
           <a:p>
             <a:fld id="{3757B9D6-B1DD-42FC-8CF6-CEEED335747B}" type="datetimeFigureOut">
               <a:rPr lang="en-IN" smtClean="0"/>
-              <a:t>08-09-2025</a:t>
+              <a:t>09-09-2025</a:t>
             </a:fld>
             <a:endParaRPr lang="en-IN"/>
           </a:p>
@@ -2081,7 +2086,7 @@
           <a:p>
             <a:fld id="{3757B9D6-B1DD-42FC-8CF6-CEEED335747B}" type="datetimeFigureOut">
               <a:rPr lang="en-IN" smtClean="0"/>
-              <a:t>08-09-2025</a:t>
+              <a:t>09-09-2025</a:t>
             </a:fld>
             <a:endParaRPr lang="en-IN"/>
           </a:p>
@@ -2394,7 +2399,7 @@
           <a:p>
             <a:fld id="{3757B9D6-B1DD-42FC-8CF6-CEEED335747B}" type="datetimeFigureOut">
               <a:rPr lang="en-IN" smtClean="0"/>
-              <a:t>08-09-2025</a:t>
+              <a:t>09-09-2025</a:t>
             </a:fld>
             <a:endParaRPr lang="en-IN"/>
           </a:p>
@@ -2683,7 +2688,7 @@
           <a:p>
             <a:fld id="{3757B9D6-B1DD-42FC-8CF6-CEEED335747B}" type="datetimeFigureOut">
               <a:rPr lang="en-IN" smtClean="0"/>
-              <a:t>08-09-2025</a:t>
+              <a:t>09-09-2025</a:t>
             </a:fld>
             <a:endParaRPr lang="en-IN"/>
           </a:p>
@@ -2926,7 +2931,7 @@
           <a:p>
             <a:fld id="{3757B9D6-B1DD-42FC-8CF6-CEEED335747B}" type="datetimeFigureOut">
               <a:rPr lang="en-IN" smtClean="0"/>
-              <a:t>08-09-2025</a:t>
+              <a:t>09-09-2025</a:t>
             </a:fld>
             <a:endParaRPr lang="en-IN"/>
           </a:p>
@@ -3895,10 +3900,10 @@
       </p:sp>
       <p:graphicFrame>
         <p:nvGraphicFramePr>
-          <p:cNvPr id="7" name="Content Placeholder 6">
-            <a:extLst>
-              <a:ext uri="{FF2B5EF4-FFF2-40B4-BE49-F238E27FC236}">
-                <a16:creationId xmlns:a16="http://schemas.microsoft.com/office/drawing/2014/main" id="{884BAD1F-DF7F-5AE1-4018-2E38BB390B54}"/>
+          <p:cNvPr id="5" name="Content Placeholder 4">
+            <a:extLst>
+              <a:ext uri="{FF2B5EF4-FFF2-40B4-BE49-F238E27FC236}">
+                <a16:creationId xmlns:a16="http://schemas.microsoft.com/office/drawing/2014/main" id="{F944D106-07E1-D524-FDCA-2ABFC4AE6C17}"/>
               </a:ext>
             </a:extLst>
           </p:cNvPr>
@@ -3909,14 +3914,14 @@
             <p:ph idx="1"/>
             <p:extLst>
               <p:ext uri="{D42A27DB-BD31-4B8C-83A1-F6EECF244321}">
-                <p14:modId xmlns:p14="http://schemas.microsoft.com/office/powerpoint/2010/main" val="2278698557"/>
+                <p14:modId xmlns:p14="http://schemas.microsoft.com/office/powerpoint/2010/main" val="161196128"/>
               </p:ext>
             </p:extLst>
           </p:nvPr>
         </p:nvGraphicFramePr>
         <p:xfrm>
-          <a:off x="1138335" y="867748"/>
-          <a:ext cx="9909110" cy="5625129"/>
+          <a:off x="1707501" y="867748"/>
+          <a:ext cx="9125339" cy="5337363"/>
         </p:xfrm>
         <a:graphic>
           <a:graphicData uri="http://schemas.openxmlformats.org/drawingml/2006/table">
@@ -3925,22 +3930,75 @@
                 <a:tableStyleId>{5C22544A-7EE6-4342-B048-85BDC9FD1C3A}</a:tableStyleId>
               </a:tblPr>
               <a:tblGrid>
-                <a:gridCol w="7990205">
+                <a:gridCol w="3790790">
                   <a:extLst>
                     <a:ext uri="{9D8B030D-6E8A-4147-A177-3AD203B41FA5}">
-                      <a16:colId xmlns:a16="http://schemas.microsoft.com/office/drawing/2014/main" val="416507198"/>
+                      <a16:colId xmlns:a16="http://schemas.microsoft.com/office/drawing/2014/main" val="1978298400"/>
                     </a:ext>
                   </a:extLst>
                 </a:gridCol>
-                <a:gridCol w="1918905">
+                <a:gridCol w="4425446">
                   <a:extLst>
                     <a:ext uri="{9D8B030D-6E8A-4147-A177-3AD203B41FA5}">
-                      <a16:colId xmlns:a16="http://schemas.microsoft.com/office/drawing/2014/main" val="4036735068"/>
+                      <a16:colId xmlns:a16="http://schemas.microsoft.com/office/drawing/2014/main" val="491931855"/>
+                    </a:ext>
+                  </a:extLst>
+                </a:gridCol>
+                <a:gridCol w="909103">
+                  <a:extLst>
+                    <a:ext uri="{9D8B030D-6E8A-4147-A177-3AD203B41FA5}">
+                      <a16:colId xmlns:a16="http://schemas.microsoft.com/office/drawing/2014/main" val="336738352"/>
                     </a:ext>
                   </a:extLst>
                 </a:gridCol>
               </a:tblGrid>
-              <a:tr h="234380">
+              <a:tr h="179543">
+                <a:tc>
+                  <a:txBody>
+                    <a:bodyPr/>
+                    <a:lstStyle/>
+                    <a:p>
+                      <a:pPr algn="ctr" rtl="0" fontAlgn="ctr"/>
+                      <a:r>
+                        <a:rPr lang="en-IN" sz="900" u="none" strike="noStrike">
+                          <a:effectLst/>
+                        </a:rPr>
+                        <a:t>Contents</a:t>
+                      </a:r>
+                      <a:endParaRPr lang="en-IN" sz="900" b="0" i="0" u="none" strike="noStrike">
+                        <a:solidFill>
+                          <a:srgbClr val="000000"/>
+                        </a:solidFill>
+                        <a:effectLst/>
+                        <a:latin typeface="Aptos" panose="02110004020202020204"/>
+                      </a:endParaRPr>
+                    </a:p>
+                  </a:txBody>
+                  <a:tcPr marL="6446" marR="6446" marT="6446" marB="0" anchor="ctr"/>
+                </a:tc>
+                <a:tc>
+                  <a:txBody>
+                    <a:bodyPr/>
+                    <a:lstStyle/>
+                    <a:p>
+                      <a:pPr algn="ctr" rtl="0" fontAlgn="ctr"/>
+                      <a:r>
+                        <a:rPr lang="en-IN" sz="900" u="none" strike="noStrike">
+                          <a:effectLst/>
+                        </a:rPr>
+                        <a:t>Date</a:t>
+                      </a:r>
+                      <a:endParaRPr lang="en-IN" sz="900" b="0" i="0" u="none" strike="noStrike">
+                        <a:solidFill>
+                          <a:srgbClr val="000000"/>
+                        </a:solidFill>
+                        <a:effectLst/>
+                        <a:latin typeface="Aptos" panose="02110004020202020204"/>
+                      </a:endParaRPr>
+                    </a:p>
+                  </a:txBody>
+                  <a:tcPr marL="6446" marR="6446" marT="6446" marB="0" anchor="ctr"/>
+                </a:tc>
                 <a:tc>
                   <a:txBody>
                     <a:bodyPr/>
@@ -3948,12 +4006,12 @@
                     <a:p>
                       <a:pPr algn="ctr" fontAlgn="ctr"/>
                       <a:r>
-                        <a:rPr lang="en-IN" sz="1100" u="none" strike="noStrike">
+                        <a:rPr lang="en-IN" sz="900" u="none" strike="noStrike">
                           <a:effectLst/>
                         </a:rPr>
-                        <a:t>Contents</a:t>
+                        <a:t>Status</a:t>
                       </a:r>
-                      <a:endParaRPr lang="en-IN" sz="1100" b="0" i="0" u="none" strike="noStrike">
+                      <a:endParaRPr lang="en-IN" sz="900" b="0" i="0" u="none" strike="noStrike">
                         <a:solidFill>
                           <a:srgbClr val="000000"/>
                         </a:solidFill>
@@ -3962,21 +4020,74 @@
                       </a:endParaRPr>
                     </a:p>
                   </a:txBody>
-                  <a:tcPr marL="7620" marR="7620" marT="7620" marB="0" anchor="ctr"/>
+                  <a:tcPr marL="6446" marR="6446" marT="6446" marB="0" anchor="ctr"/>
                 </a:tc>
+                <a:extLst>
+                  <a:ext uri="{0D108BD9-81ED-4DB2-BD59-A6C34878D82A}">
+                    <a16:rowId xmlns:a16="http://schemas.microsoft.com/office/drawing/2014/main" val="977491592"/>
+                  </a:ext>
+                </a:extLst>
+              </a:tr>
+              <a:tr h="483985">
                 <a:tc>
+                  <a:txBody>
+                    <a:bodyPr/>
+                    <a:lstStyle/>
+                    <a:p>
+                      <a:pPr algn="ctr" rtl="0" fontAlgn="ctr"/>
+                      <a:r>
+                        <a:rPr lang="en-IN" sz="1300" u="none" strike="noStrike">
+                          <a:effectLst/>
+                        </a:rPr>
+                        <a:t>⌨️ (0:00:00) Introduction ⌨️</a:t>
+                      </a:r>
+                      <a:endParaRPr lang="en-IN" sz="1300" b="0" i="0" u="none" strike="noStrike">
+                        <a:solidFill>
+                          <a:srgbClr val="000000"/>
+                        </a:solidFill>
+                        <a:effectLst/>
+                        <a:latin typeface="Aptos" panose="02110004020202020204"/>
+                      </a:endParaRPr>
+                    </a:p>
+                  </a:txBody>
+                  <a:tcPr marL="6446" marR="6446" marT="6446" marB="0" anchor="ctr"/>
+                </a:tc>
+                <a:tc rowSpan="4">
+                  <a:txBody>
+                    <a:bodyPr/>
+                    <a:lstStyle/>
+                    <a:p>
+                      <a:pPr algn="ctr" rtl="0" fontAlgn="ctr"/>
+                      <a:r>
+                        <a:rPr lang="en-IN" sz="900" u="none" strike="noStrike">
+                          <a:effectLst/>
+                        </a:rPr>
+                        <a:t>09-09-2025</a:t>
+                      </a:r>
+                      <a:endParaRPr lang="en-IN" sz="900" b="0" i="0" u="none" strike="noStrike">
+                        <a:solidFill>
+                          <a:srgbClr val="000000"/>
+                        </a:solidFill>
+                        <a:effectLst/>
+                        <a:latin typeface="Aptos" panose="02110004020202020204"/>
+                      </a:endParaRPr>
+                    </a:p>
+                  </a:txBody>
+                  <a:tcPr marL="6446" marR="6446" marT="6446" marB="0" anchor="ctr"/>
+                </a:tc>
+                <a:tc rowSpan="4">
                   <a:txBody>
                     <a:bodyPr/>
                     <a:lstStyle/>
                     <a:p>
                       <a:pPr algn="ctr" fontAlgn="ctr"/>
                       <a:r>
-                        <a:rPr lang="en-IN" sz="1100" u="none" strike="noStrike">
+                        <a:rPr lang="en-IN" sz="900" u="none" strike="noStrike">
                           <a:effectLst/>
                         </a:rPr>
-                        <a:t>Date</a:t>
+                        <a:t>DONE</a:t>
                       </a:r>
-                      <a:endParaRPr lang="en-IN" sz="1100" b="0" i="0" u="none" strike="noStrike">
+                      <a:endParaRPr lang="en-IN" sz="900" b="0" i="0" u="none" strike="noStrike">
                         <a:solidFill>
                           <a:srgbClr val="000000"/>
                         </a:solidFill>
@@ -3985,90 +4096,47 @@
                       </a:endParaRPr>
                     </a:p>
                   </a:txBody>
-                  <a:tcPr marL="7620" marR="7620" marT="7620" marB="0" anchor="ctr"/>
+                  <a:tcPr marL="6446" marR="6446" marT="6446" marB="0" anchor="ctr"/>
                 </a:tc>
                 <a:extLst>
                   <a:ext uri="{0D108BD9-81ED-4DB2-BD59-A6C34878D82A}">
-                    <a16:rowId xmlns:a16="http://schemas.microsoft.com/office/drawing/2014/main" val="1064468927"/>
+                    <a16:rowId xmlns:a16="http://schemas.microsoft.com/office/drawing/2014/main" val="121727713"/>
                   </a:ext>
                 </a:extLst>
               </a:tr>
-              <a:tr h="336285">
+              <a:tr h="487627">
                 <a:tc>
                   <a:txBody>
                     <a:bodyPr/>
                     <a:lstStyle/>
                     <a:p>
-                      <a:pPr algn="ctr" fontAlgn="ctr"/>
+                      <a:pPr algn="ctr" rtl="0" fontAlgn="ctr"/>
                       <a:r>
-                        <a:rPr lang="en-IN" sz="1500" u="none" strike="noStrike">
+                        <a:rPr lang="en-US" sz="1300" u="none" strike="noStrike">
                           <a:effectLst/>
                         </a:rPr>
-                        <a:t>⌨️ (0:00:00) Introduction ⌨️</a:t>
+                        <a:t>(0:01:54) Choosing a Text Editor ⌨️</a:t>
                       </a:r>
-                      <a:endParaRPr lang="en-IN" sz="1500" b="0" i="0" u="none" strike="noStrike">
+                      <a:endParaRPr lang="en-US" sz="1300" b="0" i="0" u="none" strike="noStrike">
                         <a:solidFill>
                           <a:srgbClr val="000000"/>
                         </a:solidFill>
                         <a:effectLst/>
-                        <a:latin typeface="Calibri" panose="020F0502020204030204" pitchFamily="34" charset="0"/>
+                        <a:latin typeface="Aptos" panose="02110004020202020204"/>
                       </a:endParaRPr>
                     </a:p>
                   </a:txBody>
-                  <a:tcPr marL="7620" marR="7620" marT="7620" marB="0" anchor="ctr"/>
+                  <a:tcPr marL="6446" marR="6446" marT="6446" marB="0" anchor="ctr"/>
                 </a:tc>
-                <a:tc rowSpan="4">
+                <a:tc vMerge="1">
                   <a:txBody>
                     <a:bodyPr/>
                     <a:lstStyle/>
                     <a:p>
-                      <a:pPr algn="ctr" fontAlgn="ctr"/>
-                      <a:r>
-                        <a:rPr lang="en-IN" sz="1100" u="none" strike="noStrike">
-                          <a:effectLst/>
-                        </a:rPr>
-                        <a:t>09-09-2025</a:t>
-                      </a:r>
-                      <a:endParaRPr lang="en-IN" sz="1100" b="0" i="0" u="none" strike="noStrike">
-                        <a:solidFill>
-                          <a:srgbClr val="000000"/>
-                        </a:solidFill>
-                        <a:effectLst/>
-                        <a:latin typeface="Aptos Narrow"/>
-                      </a:endParaRPr>
+                      <a:endParaRPr lang="en-IN"/>
                     </a:p>
                   </a:txBody>
-                  <a:tcPr marL="7620" marR="7620" marT="7620" marB="0" anchor="ctr"/>
-                </a:tc>
-                <a:extLst>
-                  <a:ext uri="{0D108BD9-81ED-4DB2-BD59-A6C34878D82A}">
-                    <a16:rowId xmlns:a16="http://schemas.microsoft.com/office/drawing/2014/main" val="4063471182"/>
-                  </a:ext>
-                </a:extLst>
-              </a:tr>
-              <a:tr h="336285">
-                <a:tc>
-                  <a:txBody>
-                    <a:bodyPr/>
-                    <a:lstStyle/>
-                    <a:p>
-                      <a:pPr algn="ctr" fontAlgn="ctr"/>
-                      <a:r>
-                        <a:rPr lang="en-US" sz="1500" u="none" strike="noStrike">
-                          <a:effectLst/>
-                        </a:rPr>
-                        <a:t>(0:01:54) Choosing a Text Editor ⌨️</a:t>
-                      </a:r>
-                      <a:endParaRPr lang="en-US" sz="1500" b="0" i="0" u="none" strike="noStrike">
-                        <a:solidFill>
-                          <a:srgbClr val="000000"/>
-                        </a:solidFill>
-                        <a:effectLst/>
-                        <a:latin typeface="Calibri" panose="020F0502020204030204" pitchFamily="34" charset="0"/>
-                      </a:endParaRPr>
-                    </a:p>
-                  </a:txBody>
-                  <a:tcPr marL="7620" marR="7620" marT="7620" marB="0" anchor="ctr"/>
+                  <a:tcPr/>
                 </a:tc>
                 <a:tc vMerge="1">
                   <a:txBody>
@@ -4082,33 +4150,43 @@
                 </a:tc>
                 <a:extLst>
                   <a:ext uri="{0D108BD9-81ED-4DB2-BD59-A6C34878D82A}">
-                    <a16:rowId xmlns:a16="http://schemas.microsoft.com/office/drawing/2014/main" val="2136940048"/>
+                    <a16:rowId xmlns:a16="http://schemas.microsoft.com/office/drawing/2014/main" val="889851252"/>
                   </a:ext>
                 </a:extLst>
               </a:tr>
-              <a:tr h="336285">
+              <a:tr h="487627">
                 <a:tc>
                   <a:txBody>
                     <a:bodyPr/>
                     <a:lstStyle/>
                     <a:p>
-                      <a:pPr algn="ctr" fontAlgn="ctr"/>
+                      <a:pPr algn="ctr" rtl="0" fontAlgn="ctr"/>
                       <a:r>
-                        <a:rPr lang="en-US" sz="1500" u="none" strike="noStrike">
+                        <a:rPr lang="en-US" sz="1300" u="none" strike="noStrike">
                           <a:effectLst/>
                         </a:rPr>
                         <a:t>(0:08:13) Creating an HTML file ⌨️</a:t>
                       </a:r>
-                      <a:endParaRPr lang="en-US" sz="1500" b="0" i="0" u="none" strike="noStrike">
+                      <a:endParaRPr lang="en-US" sz="1300" b="0" i="0" u="none" strike="noStrike">
                         <a:solidFill>
                           <a:srgbClr val="000000"/>
                         </a:solidFill>
                         <a:effectLst/>
-                        <a:latin typeface="Calibri" panose="020F0502020204030204" pitchFamily="34" charset="0"/>
+                        <a:latin typeface="Aptos" panose="02110004020202020204"/>
                       </a:endParaRPr>
                     </a:p>
                   </a:txBody>
-                  <a:tcPr marL="7620" marR="7620" marT="7620" marB="0" anchor="ctr"/>
+                  <a:tcPr marL="6446" marR="6446" marT="6446" marB="0" anchor="ctr"/>
+                </a:tc>
+                <a:tc vMerge="1">
+                  <a:txBody>
+                    <a:bodyPr/>
+                    <a:lstStyle/>
+                    <a:p>
+                      <a:endParaRPr lang="en-IN"/>
+                    </a:p>
+                  </a:txBody>
+                  <a:tcPr/>
                 </a:tc>
                 <a:tc vMerge="1">
                   <a:txBody>
@@ -4122,33 +4200,43 @@
                 </a:tc>
                 <a:extLst>
                   <a:ext uri="{0D108BD9-81ED-4DB2-BD59-A6C34878D82A}">
-                    <a16:rowId xmlns:a16="http://schemas.microsoft.com/office/drawing/2014/main" val="1899152037"/>
+                    <a16:rowId xmlns:a16="http://schemas.microsoft.com/office/drawing/2014/main" val="2632269962"/>
                   </a:ext>
                 </a:extLst>
               </a:tr>
-              <a:tr h="336285">
+              <a:tr h="247717">
                 <a:tc>
                   <a:txBody>
                     <a:bodyPr/>
                     <a:lstStyle/>
                     <a:p>
-                      <a:pPr algn="ctr" fontAlgn="ctr"/>
+                      <a:pPr algn="ctr" rtl="0" fontAlgn="ctr"/>
                       <a:r>
-                        <a:rPr lang="en-IN" sz="1500" u="none" strike="noStrike">
+                        <a:rPr lang="en-IN" sz="1300" u="none" strike="noStrike">
                           <a:effectLst/>
                         </a:rPr>
                         <a:t>(0:20:31) Basic Tags ⌨️ </a:t>
                       </a:r>
-                      <a:endParaRPr lang="en-IN" sz="1500" b="0" i="0" u="none" strike="noStrike">
+                      <a:endParaRPr lang="en-IN" sz="1300" b="0" i="0" u="none" strike="noStrike">
                         <a:solidFill>
                           <a:srgbClr val="000000"/>
                         </a:solidFill>
                         <a:effectLst/>
-                        <a:latin typeface="Calibri" panose="020F0502020204030204" pitchFamily="34" charset="0"/>
+                        <a:latin typeface="Aptos" panose="02110004020202020204"/>
                       </a:endParaRPr>
                     </a:p>
                   </a:txBody>
-                  <a:tcPr marL="7620" marR="7620" marT="7620" marB="0" anchor="ctr"/>
+                  <a:tcPr marL="6446" marR="6446" marT="6446" marB="0" anchor="ctr"/>
+                </a:tc>
+                <a:tc vMerge="1">
+                  <a:txBody>
+                    <a:bodyPr/>
+                    <a:lstStyle/>
+                    <a:p>
+                      <a:endParaRPr lang="en-IN"/>
+                    </a:p>
+                  </a:txBody>
+                  <a:tcPr/>
                 </a:tc>
                 <a:tc vMerge="1">
                   <a:txBody>
@@ -4162,33 +4250,56 @@
                 </a:tc>
                 <a:extLst>
                   <a:ext uri="{0D108BD9-81ED-4DB2-BD59-A6C34878D82A}">
-                    <a16:rowId xmlns:a16="http://schemas.microsoft.com/office/drawing/2014/main" val="146375548"/>
+                    <a16:rowId xmlns:a16="http://schemas.microsoft.com/office/drawing/2014/main" val="4173629915"/>
                   </a:ext>
                 </a:extLst>
               </a:tr>
-              <a:tr h="336285">
+              <a:tr h="247717">
                 <a:tc>
                   <a:txBody>
                     <a:bodyPr/>
                     <a:lstStyle/>
                     <a:p>
-                      <a:pPr algn="ctr" fontAlgn="ctr"/>
+                      <a:pPr algn="ctr" rtl="0" fontAlgn="ctr"/>
                       <a:r>
-                        <a:rPr lang="en-IN" sz="1500" u="none" strike="noStrike">
+                        <a:rPr lang="en-IN" sz="1300" u="none" strike="noStrike">
                           <a:effectLst/>
                         </a:rPr>
                         <a:t>(0:36:47) Comments ⌨️</a:t>
                       </a:r>
-                      <a:endParaRPr lang="en-IN" sz="1500" b="0" i="0" u="none" strike="noStrike">
+                      <a:endParaRPr lang="en-IN" sz="1300" b="0" i="0" u="none" strike="noStrike">
                         <a:solidFill>
                           <a:srgbClr val="000000"/>
                         </a:solidFill>
                         <a:effectLst/>
-                        <a:latin typeface="Calibri" panose="020F0502020204030204" pitchFamily="34" charset="0"/>
+                        <a:latin typeface="Aptos" panose="02110004020202020204"/>
                       </a:endParaRPr>
                     </a:p>
                   </a:txBody>
-                  <a:tcPr marL="7620" marR="7620" marT="7620" marB="0" anchor="ctr"/>
+                  <a:tcPr marL="6446" marR="6446" marT="6446" marB="0" anchor="ctr"/>
+                </a:tc>
+                <a:tc rowSpan="2">
+                  <a:txBody>
+                    <a:bodyPr/>
+                    <a:lstStyle/>
+                    <a:p>
+                      <a:pPr algn="ctr" rtl="0" fontAlgn="ctr"/>
+                      <a:r>
+                        <a:rPr lang="en-IN" sz="900" u="none" strike="noStrike">
+                          <a:effectLst/>
+                        </a:rPr>
+                        <a:t>10-09-2025</a:t>
+                      </a:r>
+                      <a:endParaRPr lang="en-IN" sz="900" b="0" i="0" u="none" strike="noStrike">
+                        <a:solidFill>
+                          <a:srgbClr val="000000"/>
+                        </a:solidFill>
+                        <a:effectLst/>
+                        <a:latin typeface="Aptos" panose="02110004020202020204"/>
+                      </a:endParaRPr>
+                    </a:p>
+                  </a:txBody>
+                  <a:tcPr marL="6446" marR="6446" marT="6446" marB="0" anchor="ctr"/>
                 </a:tc>
                 <a:tc rowSpan="2">
                   <a:txBody>
@@ -4197,12 +4308,12 @@
                     <a:p>
                       <a:pPr algn="ctr" fontAlgn="ctr"/>
                       <a:r>
-                        <a:rPr lang="en-IN" sz="1100" u="none" strike="noStrike">
+                        <a:rPr lang="en-IN" sz="900" u="none" strike="noStrike">
                           <a:effectLst/>
                         </a:rPr>
-                        <a:t>10-09-2025</a:t>
+                        <a:t> </a:t>
                       </a:r>
-                      <a:endParaRPr lang="en-IN" sz="1100" b="0" i="0" u="none" strike="noStrike">
+                      <a:endParaRPr lang="en-IN" sz="900" b="0" i="0" u="none" strike="noStrike">
                         <a:solidFill>
                           <a:srgbClr val="000000"/>
                         </a:solidFill>
@@ -4211,37 +4322,47 @@
                       </a:endParaRPr>
                     </a:p>
                   </a:txBody>
-                  <a:tcPr marL="7620" marR="7620" marT="7620" marB="0" anchor="ctr"/>
+                  <a:tcPr marL="6446" marR="6446" marT="6446" marB="0" anchor="ctr"/>
                 </a:tc>
                 <a:extLst>
                   <a:ext uri="{0D108BD9-81ED-4DB2-BD59-A6C34878D82A}">
-                    <a16:rowId xmlns:a16="http://schemas.microsoft.com/office/drawing/2014/main" val="3722433681"/>
+                    <a16:rowId xmlns:a16="http://schemas.microsoft.com/office/drawing/2014/main" val="2790479357"/>
                   </a:ext>
                 </a:extLst>
               </a:tr>
-              <a:tr h="336285">
+              <a:tr h="247717">
                 <a:tc>
                   <a:txBody>
                     <a:bodyPr/>
                     <a:lstStyle/>
                     <a:p>
-                      <a:pPr algn="ctr" fontAlgn="ctr"/>
+                      <a:pPr algn="ctr" rtl="0" fontAlgn="ctr"/>
                       <a:r>
-                        <a:rPr lang="en-IN" sz="1500" u="none" strike="noStrike">
+                        <a:rPr lang="en-IN" sz="1300" u="none" strike="noStrike">
                           <a:effectLst/>
                         </a:rPr>
                         <a:t>(0:42:13) Style &amp; Color ⌨️</a:t>
                       </a:r>
-                      <a:endParaRPr lang="en-IN" sz="1500" b="0" i="0" u="none" strike="noStrike">
+                      <a:endParaRPr lang="en-IN" sz="1300" b="0" i="0" u="none" strike="noStrike">
                         <a:solidFill>
                           <a:srgbClr val="000000"/>
                         </a:solidFill>
                         <a:effectLst/>
-                        <a:latin typeface="Calibri" panose="020F0502020204030204" pitchFamily="34" charset="0"/>
+                        <a:latin typeface="Aptos" panose="02110004020202020204"/>
                       </a:endParaRPr>
                     </a:p>
                   </a:txBody>
-                  <a:tcPr marL="7620" marR="7620" marT="7620" marB="0" anchor="ctr"/>
+                  <a:tcPr marL="6446" marR="6446" marT="6446" marB="0" anchor="ctr"/>
+                </a:tc>
+                <a:tc vMerge="1">
+                  <a:txBody>
+                    <a:bodyPr/>
+                    <a:lstStyle/>
+                    <a:p>
+                      <a:endParaRPr lang="en-IN"/>
+                    </a:p>
+                  </a:txBody>
+                  <a:tcPr/>
                 </a:tc>
                 <a:tc vMerge="1">
                   <a:txBody>
@@ -4255,33 +4376,56 @@
                 </a:tc>
                 <a:extLst>
                   <a:ext uri="{0D108BD9-81ED-4DB2-BD59-A6C34878D82A}">
-                    <a16:rowId xmlns:a16="http://schemas.microsoft.com/office/drawing/2014/main" val="1214723785"/>
+                    <a16:rowId xmlns:a16="http://schemas.microsoft.com/office/drawing/2014/main" val="390672420"/>
                   </a:ext>
                 </a:extLst>
               </a:tr>
-              <a:tr h="336285">
+              <a:tr h="483985">
                 <a:tc>
                   <a:txBody>
                     <a:bodyPr/>
                     <a:lstStyle/>
                     <a:p>
-                      <a:pPr algn="ctr" fontAlgn="ctr"/>
+                      <a:pPr algn="ctr" rtl="0" fontAlgn="ctr"/>
                       <a:r>
-                        <a:rPr lang="en-IN" sz="1500" u="none" strike="noStrike">
+                        <a:rPr lang="en-IN" sz="1300" u="none" strike="noStrike">
                           <a:effectLst/>
                         </a:rPr>
                         <a:t>(0:48:07) Formatting a Page ⌨️</a:t>
                       </a:r>
-                      <a:endParaRPr lang="en-IN" sz="1500" b="0" i="0" u="none" strike="noStrike">
+                      <a:endParaRPr lang="en-IN" sz="1300" b="0" i="0" u="none" strike="noStrike">
                         <a:solidFill>
                           <a:srgbClr val="000000"/>
                         </a:solidFill>
                         <a:effectLst/>
-                        <a:latin typeface="Calibri" panose="020F0502020204030204" pitchFamily="34" charset="0"/>
+                        <a:latin typeface="Aptos" panose="02110004020202020204"/>
                       </a:endParaRPr>
                     </a:p>
                   </a:txBody>
-                  <a:tcPr marL="7620" marR="7620" marT="7620" marB="0" anchor="ctr"/>
+                  <a:tcPr marL="6446" marR="6446" marT="6446" marB="0" anchor="ctr"/>
+                </a:tc>
+                <a:tc rowSpan="3">
+                  <a:txBody>
+                    <a:bodyPr/>
+                    <a:lstStyle/>
+                    <a:p>
+                      <a:pPr algn="ctr" rtl="0" fontAlgn="ctr"/>
+                      <a:r>
+                        <a:rPr lang="en-IN" sz="900" u="none" strike="noStrike">
+                          <a:effectLst/>
+                        </a:rPr>
+                        <a:t>11-09-2025</a:t>
+                      </a:r>
+                      <a:endParaRPr lang="en-IN" sz="900" b="0" i="0" u="none" strike="noStrike">
+                        <a:solidFill>
+                          <a:srgbClr val="000000"/>
+                        </a:solidFill>
+                        <a:effectLst/>
+                        <a:latin typeface="Aptos" panose="02110004020202020204"/>
+                      </a:endParaRPr>
+                    </a:p>
+                  </a:txBody>
+                  <a:tcPr marL="6446" marR="6446" marT="6446" marB="0" anchor="ctr"/>
                 </a:tc>
                 <a:tc rowSpan="3">
                   <a:txBody>
@@ -4290,12 +4434,12 @@
                     <a:p>
                       <a:pPr algn="ctr" fontAlgn="ctr"/>
                       <a:r>
-                        <a:rPr lang="en-IN" sz="1100" u="none" strike="noStrike">
+                        <a:rPr lang="en-IN" sz="900" u="none" strike="noStrike">
                           <a:effectLst/>
                         </a:rPr>
-                        <a:t>11-09-2025</a:t>
+                        <a:t> </a:t>
                       </a:r>
-                      <a:endParaRPr lang="en-IN" sz="1100" b="0" i="0" u="none" strike="noStrike">
+                      <a:endParaRPr lang="en-IN" sz="900" b="0" i="0" u="none" strike="noStrike">
                         <a:solidFill>
                           <a:srgbClr val="000000"/>
                         </a:solidFill>
@@ -4304,37 +4448,47 @@
                       </a:endParaRPr>
                     </a:p>
                   </a:txBody>
-                  <a:tcPr marL="7620" marR="7620" marT="7620" marB="0" anchor="ctr"/>
+                  <a:tcPr marL="6446" marR="6446" marT="6446" marB="0" anchor="ctr"/>
                 </a:tc>
                 <a:extLst>
                   <a:ext uri="{0D108BD9-81ED-4DB2-BD59-A6C34878D82A}">
-                    <a16:rowId xmlns:a16="http://schemas.microsoft.com/office/drawing/2014/main" val="1871078558"/>
+                    <a16:rowId xmlns:a16="http://schemas.microsoft.com/office/drawing/2014/main" val="1429437788"/>
                   </a:ext>
                 </a:extLst>
               </a:tr>
-              <a:tr h="336285">
+              <a:tr h="247717">
                 <a:tc>
                   <a:txBody>
                     <a:bodyPr/>
                     <a:lstStyle/>
                     <a:p>
-                      <a:pPr algn="ctr" fontAlgn="ctr"/>
+                      <a:pPr algn="ctr" rtl="0" fontAlgn="ctr"/>
                       <a:r>
-                        <a:rPr lang="en-IN" sz="1500" u="none" strike="noStrike">
+                        <a:rPr lang="en-IN" sz="1300" u="none" strike="noStrike">
                           <a:effectLst/>
                         </a:rPr>
                         <a:t>(0:59:16) Links ⌨️</a:t>
                       </a:r>
-                      <a:endParaRPr lang="en-IN" sz="1500" b="0" i="0" u="none" strike="noStrike">
+                      <a:endParaRPr lang="en-IN" sz="1300" b="0" i="0" u="none" strike="noStrike">
                         <a:solidFill>
                           <a:srgbClr val="000000"/>
                         </a:solidFill>
                         <a:effectLst/>
-                        <a:latin typeface="Calibri" panose="020F0502020204030204" pitchFamily="34" charset="0"/>
+                        <a:latin typeface="Aptos" panose="02110004020202020204"/>
                       </a:endParaRPr>
                     </a:p>
                   </a:txBody>
-                  <a:tcPr marL="7620" marR="7620" marT="7620" marB="0" anchor="ctr"/>
+                  <a:tcPr marL="6446" marR="6446" marT="6446" marB="0" anchor="ctr"/>
+                </a:tc>
+                <a:tc vMerge="1">
+                  <a:txBody>
+                    <a:bodyPr/>
+                    <a:lstStyle/>
+                    <a:p>
+                      <a:endParaRPr lang="en-IN"/>
+                    </a:p>
+                  </a:txBody>
+                  <a:tcPr/>
                 </a:tc>
                 <a:tc vMerge="1">
                   <a:txBody>
@@ -4348,33 +4502,43 @@
                 </a:tc>
                 <a:extLst>
                   <a:ext uri="{0D108BD9-81ED-4DB2-BD59-A6C34878D82A}">
-                    <a16:rowId xmlns:a16="http://schemas.microsoft.com/office/drawing/2014/main" val="314906443"/>
+                    <a16:rowId xmlns:a16="http://schemas.microsoft.com/office/drawing/2014/main" val="3119642762"/>
                   </a:ext>
                 </a:extLst>
               </a:tr>
-              <a:tr h="336285">
+              <a:tr h="247717">
                 <a:tc>
                   <a:txBody>
                     <a:bodyPr/>
                     <a:lstStyle/>
                     <a:p>
-                      <a:pPr algn="ctr" fontAlgn="ctr"/>
+                      <a:pPr algn="ctr" rtl="0" fontAlgn="ctr"/>
                       <a:r>
-                        <a:rPr lang="en-IN" sz="1500" u="none" strike="noStrike">
+                        <a:rPr lang="en-IN" sz="1300" u="none" strike="noStrike">
                           <a:effectLst/>
                         </a:rPr>
                         <a:t>(1:07:33) Images ⌨️</a:t>
                       </a:r>
-                      <a:endParaRPr lang="en-IN" sz="1500" b="0" i="0" u="none" strike="noStrike">
+                      <a:endParaRPr lang="en-IN" sz="1300" b="0" i="0" u="none" strike="noStrike">
                         <a:solidFill>
                           <a:srgbClr val="000000"/>
                         </a:solidFill>
                         <a:effectLst/>
-                        <a:latin typeface="Calibri" panose="020F0502020204030204" pitchFamily="34" charset="0"/>
+                        <a:latin typeface="Aptos" panose="02110004020202020204"/>
                       </a:endParaRPr>
                     </a:p>
                   </a:txBody>
-                  <a:tcPr marL="7620" marR="7620" marT="7620" marB="0" anchor="ctr"/>
+                  <a:tcPr marL="6446" marR="6446" marT="6446" marB="0" anchor="ctr"/>
+                </a:tc>
+                <a:tc vMerge="1">
+                  <a:txBody>
+                    <a:bodyPr/>
+                    <a:lstStyle/>
+                    <a:p>
+                      <a:endParaRPr lang="en-IN"/>
+                    </a:p>
+                  </a:txBody>
+                  <a:tcPr/>
                 </a:tc>
                 <a:tc vMerge="1">
                   <a:txBody>
@@ -4388,33 +4552,56 @@
                 </a:tc>
                 <a:extLst>
                   <a:ext uri="{0D108BD9-81ED-4DB2-BD59-A6C34878D82A}">
-                    <a16:rowId xmlns:a16="http://schemas.microsoft.com/office/drawing/2014/main" val="3212899108"/>
+                    <a16:rowId xmlns:a16="http://schemas.microsoft.com/office/drawing/2014/main" val="2198942070"/>
                   </a:ext>
                 </a:extLst>
               </a:tr>
-              <a:tr h="336285">
+              <a:tr h="487627">
                 <a:tc>
                   <a:txBody>
                     <a:bodyPr/>
                     <a:lstStyle/>
                     <a:p>
-                      <a:pPr algn="ctr" fontAlgn="ctr"/>
+                      <a:pPr algn="ctr" rtl="0" fontAlgn="ctr"/>
                       <a:r>
-                        <a:rPr lang="en-IN" sz="1500" u="none" strike="noStrike">
+                        <a:rPr lang="en-IN" sz="1300" u="none" strike="noStrike">
                           <a:effectLst/>
                         </a:rPr>
                         <a:t>(1:16:12) Videos &amp; Youtube iFrames ⌨️</a:t>
                       </a:r>
-                      <a:endParaRPr lang="en-IN" sz="1500" b="0" i="0" u="none" strike="noStrike">
+                      <a:endParaRPr lang="en-IN" sz="1300" b="0" i="0" u="none" strike="noStrike">
                         <a:solidFill>
                           <a:srgbClr val="000000"/>
                         </a:solidFill>
                         <a:effectLst/>
-                        <a:latin typeface="Calibri" panose="020F0502020204030204" pitchFamily="34" charset="0"/>
+                        <a:latin typeface="Aptos" panose="02110004020202020204"/>
                       </a:endParaRPr>
                     </a:p>
                   </a:txBody>
-                  <a:tcPr marL="7620" marR="7620" marT="7620" marB="0" anchor="ctr"/>
+                  <a:tcPr marL="6446" marR="6446" marT="6446" marB="0" anchor="ctr"/>
+                </a:tc>
+                <a:tc rowSpan="3">
+                  <a:txBody>
+                    <a:bodyPr/>
+                    <a:lstStyle/>
+                    <a:p>
+                      <a:pPr algn="ctr" rtl="0" fontAlgn="ctr"/>
+                      <a:r>
+                        <a:rPr lang="en-IN" sz="900" u="none" strike="noStrike">
+                          <a:effectLst/>
+                        </a:rPr>
+                        <a:t>12-09-2025</a:t>
+                      </a:r>
+                      <a:endParaRPr lang="en-IN" sz="900" b="0" i="0" u="none" strike="noStrike">
+                        <a:solidFill>
+                          <a:srgbClr val="000000"/>
+                        </a:solidFill>
+                        <a:effectLst/>
+                        <a:latin typeface="Aptos" panose="02110004020202020204"/>
+                      </a:endParaRPr>
+                    </a:p>
+                  </a:txBody>
+                  <a:tcPr marL="6446" marR="6446" marT="6446" marB="0" anchor="ctr"/>
                 </a:tc>
                 <a:tc rowSpan="3">
                   <a:txBody>
@@ -4423,12 +4610,12 @@
                     <a:p>
                       <a:pPr algn="ctr" fontAlgn="ctr"/>
                       <a:r>
-                        <a:rPr lang="en-IN" sz="1100" u="none" strike="noStrike">
+                        <a:rPr lang="en-IN" sz="900" u="none" strike="noStrike">
                           <a:effectLst/>
                         </a:rPr>
-                        <a:t>12-09-2025</a:t>
+                        <a:t> </a:t>
                       </a:r>
-                      <a:endParaRPr lang="en-IN" sz="1100" b="0" i="0" u="none" strike="noStrike">
+                      <a:endParaRPr lang="en-IN" sz="900" b="0" i="0" u="none" strike="noStrike">
                         <a:solidFill>
                           <a:srgbClr val="000000"/>
                         </a:solidFill>
@@ -4437,37 +4624,47 @@
                       </a:endParaRPr>
                     </a:p>
                   </a:txBody>
-                  <a:tcPr marL="7620" marR="7620" marT="7620" marB="0" anchor="ctr"/>
+                  <a:tcPr marL="6446" marR="6446" marT="6446" marB="0" anchor="ctr"/>
                 </a:tc>
                 <a:extLst>
                   <a:ext uri="{0D108BD9-81ED-4DB2-BD59-A6C34878D82A}">
-                    <a16:rowId xmlns:a16="http://schemas.microsoft.com/office/drawing/2014/main" val="2321143621"/>
+                    <a16:rowId xmlns:a16="http://schemas.microsoft.com/office/drawing/2014/main" val="324643529"/>
                   </a:ext>
                 </a:extLst>
               </a:tr>
-              <a:tr h="336285">
+              <a:tr h="247717">
                 <a:tc>
                   <a:txBody>
                     <a:bodyPr/>
                     <a:lstStyle/>
                     <a:p>
-                      <a:pPr algn="ctr" fontAlgn="ctr"/>
+                      <a:pPr algn="ctr" rtl="0" fontAlgn="ctr"/>
                       <a:r>
-                        <a:rPr lang="en-IN" sz="1500" u="none" strike="noStrike">
+                        <a:rPr lang="en-IN" sz="1300" u="none" strike="noStrike">
                           <a:effectLst/>
                         </a:rPr>
                         <a:t>(1:23:00) Lists ⌨️</a:t>
                       </a:r>
-                      <a:endParaRPr lang="en-IN" sz="1500" b="0" i="0" u="none" strike="noStrike">
+                      <a:endParaRPr lang="en-IN" sz="1300" b="0" i="0" u="none" strike="noStrike">
                         <a:solidFill>
                           <a:srgbClr val="000000"/>
                         </a:solidFill>
                         <a:effectLst/>
-                        <a:latin typeface="Calibri" panose="020F0502020204030204" pitchFamily="34" charset="0"/>
+                        <a:latin typeface="Aptos" panose="02110004020202020204"/>
                       </a:endParaRPr>
                     </a:p>
                   </a:txBody>
-                  <a:tcPr marL="7620" marR="7620" marT="7620" marB="0" anchor="ctr"/>
+                  <a:tcPr marL="6446" marR="6446" marT="6446" marB="0" anchor="ctr"/>
+                </a:tc>
+                <a:tc vMerge="1">
+                  <a:txBody>
+                    <a:bodyPr/>
+                    <a:lstStyle/>
+                    <a:p>
+                      <a:endParaRPr lang="en-IN"/>
+                    </a:p>
+                  </a:txBody>
+                  <a:tcPr/>
                 </a:tc>
                 <a:tc vMerge="1">
                   <a:txBody>
@@ -4481,33 +4678,43 @@
                 </a:tc>
                 <a:extLst>
                   <a:ext uri="{0D108BD9-81ED-4DB2-BD59-A6C34878D82A}">
-                    <a16:rowId xmlns:a16="http://schemas.microsoft.com/office/drawing/2014/main" val="1778478213"/>
+                    <a16:rowId xmlns:a16="http://schemas.microsoft.com/office/drawing/2014/main" val="1501045310"/>
                   </a:ext>
                 </a:extLst>
               </a:tr>
-              <a:tr h="336285">
+              <a:tr h="247717">
                 <a:tc>
                   <a:txBody>
                     <a:bodyPr/>
                     <a:lstStyle/>
                     <a:p>
-                      <a:pPr algn="ctr" fontAlgn="ctr"/>
+                      <a:pPr algn="ctr" rtl="0" fontAlgn="ctr"/>
                       <a:r>
-                        <a:rPr lang="en-IN" sz="1500" u="none" strike="noStrike">
+                        <a:rPr lang="en-IN" sz="1300" u="none" strike="noStrike">
                           <a:effectLst/>
                         </a:rPr>
                         <a:t>(1:28:53) Tables ⌨️ </a:t>
                       </a:r>
-                      <a:endParaRPr lang="en-IN" sz="1500" b="0" i="0" u="none" strike="noStrike">
+                      <a:endParaRPr lang="en-IN" sz="1300" b="0" i="0" u="none" strike="noStrike">
                         <a:solidFill>
                           <a:srgbClr val="000000"/>
                         </a:solidFill>
                         <a:effectLst/>
-                        <a:latin typeface="Calibri" panose="020F0502020204030204" pitchFamily="34" charset="0"/>
+                        <a:latin typeface="Aptos" panose="02110004020202020204"/>
                       </a:endParaRPr>
                     </a:p>
                   </a:txBody>
-                  <a:tcPr marL="7620" marR="7620" marT="7620" marB="0" anchor="ctr"/>
+                  <a:tcPr marL="6446" marR="6446" marT="6446" marB="0" anchor="ctr"/>
+                </a:tc>
+                <a:tc vMerge="1">
+                  <a:txBody>
+                    <a:bodyPr/>
+                    <a:lstStyle/>
+                    <a:p>
+                      <a:endParaRPr lang="en-IN"/>
+                    </a:p>
+                  </a:txBody>
+                  <a:tcPr/>
                 </a:tc>
                 <a:tc vMerge="1">
                   <a:txBody>
@@ -4521,33 +4728,56 @@
                 </a:tc>
                 <a:extLst>
                   <a:ext uri="{0D108BD9-81ED-4DB2-BD59-A6C34878D82A}">
-                    <a16:rowId xmlns:a16="http://schemas.microsoft.com/office/drawing/2014/main" val="1816089040"/>
+                    <a16:rowId xmlns:a16="http://schemas.microsoft.com/office/drawing/2014/main" val="518820903"/>
                   </a:ext>
                 </a:extLst>
               </a:tr>
-              <a:tr h="336285">
+              <a:tr h="247717">
                 <a:tc>
                   <a:txBody>
                     <a:bodyPr/>
                     <a:lstStyle/>
                     <a:p>
-                      <a:pPr algn="ctr" fontAlgn="ctr"/>
+                      <a:pPr algn="ctr" rtl="0" fontAlgn="ctr"/>
                       <a:r>
-                        <a:rPr lang="en-IN" sz="1500" u="none" strike="noStrike">
+                        <a:rPr lang="en-IN" sz="1300" u="none" strike="noStrike">
                           <a:effectLst/>
                         </a:rPr>
                         <a:t>(1:37:21) Divs &amp; Spans ⌨️</a:t>
                       </a:r>
-                      <a:endParaRPr lang="en-IN" sz="1500" b="0" i="0" u="none" strike="noStrike">
+                      <a:endParaRPr lang="en-IN" sz="1300" b="0" i="0" u="none" strike="noStrike">
                         <a:solidFill>
                           <a:srgbClr val="000000"/>
                         </a:solidFill>
                         <a:effectLst/>
-                        <a:latin typeface="Calibri" panose="020F0502020204030204" pitchFamily="34" charset="0"/>
+                        <a:latin typeface="Aptos" panose="02110004020202020204"/>
                       </a:endParaRPr>
                     </a:p>
                   </a:txBody>
-                  <a:tcPr marL="7620" marR="7620" marT="7620" marB="0" anchor="ctr"/>
+                  <a:tcPr marL="6446" marR="6446" marT="6446" marB="0" anchor="ctr"/>
+                </a:tc>
+                <a:tc rowSpan="4">
+                  <a:txBody>
+                    <a:bodyPr/>
+                    <a:lstStyle/>
+                    <a:p>
+                      <a:pPr algn="ctr" rtl="0" fontAlgn="ctr"/>
+                      <a:r>
+                        <a:rPr lang="en-IN" sz="900" u="none" strike="noStrike">
+                          <a:effectLst/>
+                        </a:rPr>
+                        <a:t>16-09-2025</a:t>
+                      </a:r>
+                      <a:endParaRPr lang="en-IN" sz="900" b="0" i="0" u="none" strike="noStrike">
+                        <a:solidFill>
+                          <a:srgbClr val="000000"/>
+                        </a:solidFill>
+                        <a:effectLst/>
+                        <a:latin typeface="Aptos" panose="02110004020202020204"/>
+                      </a:endParaRPr>
+                    </a:p>
+                  </a:txBody>
+                  <a:tcPr marL="6446" marR="6446" marT="6446" marB="0" anchor="ctr"/>
                 </a:tc>
                 <a:tc rowSpan="4">
                   <a:txBody>
@@ -4556,12 +4786,12 @@
                     <a:p>
                       <a:pPr algn="ctr" fontAlgn="ctr"/>
                       <a:r>
-                        <a:rPr lang="en-IN" sz="1100" u="none" strike="noStrike">
+                        <a:rPr lang="en-IN" sz="900" u="none" strike="noStrike">
                           <a:effectLst/>
                         </a:rPr>
-                        <a:t>16-09-2025</a:t>
+                        <a:t> </a:t>
                       </a:r>
-                      <a:endParaRPr lang="en-IN" sz="1100" b="0" i="0" u="none" strike="noStrike">
+                      <a:endParaRPr lang="en-IN" sz="900" b="0" i="0" u="none" strike="noStrike">
                         <a:solidFill>
                           <a:srgbClr val="000000"/>
                         </a:solidFill>
@@ -4570,37 +4800,47 @@
                       </a:endParaRPr>
                     </a:p>
                   </a:txBody>
-                  <a:tcPr marL="7620" marR="7620" marT="7620" marB="0" anchor="ctr"/>
+                  <a:tcPr marL="6446" marR="6446" marT="6446" marB="0" anchor="ctr"/>
                 </a:tc>
                 <a:extLst>
                   <a:ext uri="{0D108BD9-81ED-4DB2-BD59-A6C34878D82A}">
-                    <a16:rowId xmlns:a16="http://schemas.microsoft.com/office/drawing/2014/main" val="7351253"/>
+                    <a16:rowId xmlns:a16="http://schemas.microsoft.com/office/drawing/2014/main" val="3667583494"/>
                   </a:ext>
                 </a:extLst>
               </a:tr>
-              <a:tr h="336285">
+              <a:tr h="247717">
                 <a:tc>
                   <a:txBody>
                     <a:bodyPr/>
                     <a:lstStyle/>
                     <a:p>
-                      <a:pPr algn="ctr" fontAlgn="ctr"/>
+                      <a:pPr algn="ctr" rtl="0" fontAlgn="ctr"/>
                       <a:r>
-                        <a:rPr lang="en-IN" sz="1500" u="none" strike="noStrike">
+                        <a:rPr lang="en-IN" sz="1300" u="none" strike="noStrike">
                           <a:effectLst/>
                         </a:rPr>
                         <a:t>(1:44:54) Input &amp; Forms ⌨️</a:t>
                       </a:r>
-                      <a:endParaRPr lang="en-IN" sz="1500" b="0" i="0" u="none" strike="noStrike">
+                      <a:endParaRPr lang="en-IN" sz="1300" b="0" i="0" u="none" strike="noStrike">
                         <a:solidFill>
                           <a:srgbClr val="000000"/>
                         </a:solidFill>
                         <a:effectLst/>
-                        <a:latin typeface="Calibri" panose="020F0502020204030204" pitchFamily="34" charset="0"/>
+                        <a:latin typeface="Aptos" panose="02110004020202020204"/>
                       </a:endParaRPr>
                     </a:p>
                   </a:txBody>
-                  <a:tcPr marL="7620" marR="7620" marT="7620" marB="0" anchor="ctr"/>
+                  <a:tcPr marL="6446" marR="6446" marT="6446" marB="0" anchor="ctr"/>
+                </a:tc>
+                <a:tc vMerge="1">
+                  <a:txBody>
+                    <a:bodyPr/>
+                    <a:lstStyle/>
+                    <a:p>
+                      <a:endParaRPr lang="en-IN"/>
+                    </a:p>
+                  </a:txBody>
+                  <a:tcPr/>
                 </a:tc>
                 <a:tc vMerge="1">
                   <a:txBody>
@@ -4614,33 +4854,43 @@
                 </a:tc>
                 <a:extLst>
                   <a:ext uri="{0D108BD9-81ED-4DB2-BD59-A6C34878D82A}">
-                    <a16:rowId xmlns:a16="http://schemas.microsoft.com/office/drawing/2014/main" val="2349962071"/>
+                    <a16:rowId xmlns:a16="http://schemas.microsoft.com/office/drawing/2014/main" val="3406586738"/>
                   </a:ext>
                 </a:extLst>
               </a:tr>
-              <a:tr h="336285">
+              <a:tr h="247717">
                 <a:tc>
                   <a:txBody>
                     <a:bodyPr/>
                     <a:lstStyle/>
                     <a:p>
-                      <a:pPr algn="ctr" fontAlgn="ctr"/>
+                      <a:pPr algn="ctr" rtl="0" fontAlgn="ctr"/>
                       <a:r>
-                        <a:rPr lang="en-IN" sz="1500" u="none" strike="noStrike">
+                        <a:rPr lang="en-IN" sz="1300" u="none" strike="noStrike">
                           <a:effectLst/>
                         </a:rPr>
                         <a:t>(1:53:44) iFrames ⌨️</a:t>
                       </a:r>
-                      <a:endParaRPr lang="en-IN" sz="1500" b="0" i="0" u="none" strike="noStrike">
+                      <a:endParaRPr lang="en-IN" sz="1300" b="0" i="0" u="none" strike="noStrike">
                         <a:solidFill>
                           <a:srgbClr val="000000"/>
                         </a:solidFill>
                         <a:effectLst/>
-                        <a:latin typeface="Calibri" panose="020F0502020204030204" pitchFamily="34" charset="0"/>
+                        <a:latin typeface="Aptos" panose="02110004020202020204"/>
                       </a:endParaRPr>
                     </a:p>
                   </a:txBody>
-                  <a:tcPr marL="7620" marR="7620" marT="7620" marB="0" anchor="ctr"/>
+                  <a:tcPr marL="6446" marR="6446" marT="6446" marB="0" anchor="ctr"/>
+                </a:tc>
+                <a:tc vMerge="1">
+                  <a:txBody>
+                    <a:bodyPr/>
+                    <a:lstStyle/>
+                    <a:p>
+                      <a:endParaRPr lang="en-IN"/>
+                    </a:p>
+                  </a:txBody>
+                  <a:tcPr/>
                 </a:tc>
                 <a:tc vMerge="1">
                   <a:txBody>
@@ -4654,33 +4904,43 @@
                 </a:tc>
                 <a:extLst>
                   <a:ext uri="{0D108BD9-81ED-4DB2-BD59-A6C34878D82A}">
-                    <a16:rowId xmlns:a16="http://schemas.microsoft.com/office/drawing/2014/main" val="3473959591"/>
+                    <a16:rowId xmlns:a16="http://schemas.microsoft.com/office/drawing/2014/main" val="2598887393"/>
                   </a:ext>
                 </a:extLst>
               </a:tr>
-              <a:tr h="346474">
+              <a:tr h="249799">
                 <a:tc>
                   <a:txBody>
                     <a:bodyPr/>
                     <a:lstStyle/>
                     <a:p>
-                      <a:pPr algn="ctr" fontAlgn="ctr"/>
+                      <a:pPr algn="ctr" rtl="0" fontAlgn="ctr"/>
                       <a:r>
-                        <a:rPr lang="en-IN" sz="1500" u="none" strike="noStrike" dirty="0">
+                        <a:rPr lang="en-IN" sz="1300" u="none" strike="noStrike" dirty="0">
                           <a:effectLst/>
                         </a:rPr>
                         <a:t>(1:57:21) Meta Tags </a:t>
                       </a:r>
-                      <a:endParaRPr lang="en-IN" sz="1500" b="0" i="0" u="none" strike="noStrike" dirty="0">
+                      <a:endParaRPr lang="en-IN" sz="1300" b="0" i="0" u="none" strike="noStrike" dirty="0">
                         <a:solidFill>
                           <a:srgbClr val="000000"/>
                         </a:solidFill>
                         <a:effectLst/>
-                        <a:latin typeface="Calibri" panose="020F0502020204030204" pitchFamily="34" charset="0"/>
+                        <a:latin typeface="Aptos" panose="02110004020202020204"/>
                       </a:endParaRPr>
                     </a:p>
                   </a:txBody>
-                  <a:tcPr marL="7620" marR="7620" marT="7620" marB="0" anchor="ctr"/>
+                  <a:tcPr marL="6446" marR="6446" marT="6446" marB="0" anchor="ctr"/>
+                </a:tc>
+                <a:tc vMerge="1">
+                  <a:txBody>
+                    <a:bodyPr/>
+                    <a:lstStyle/>
+                    <a:p>
+                      <a:endParaRPr lang="en-IN"/>
+                    </a:p>
+                  </a:txBody>
+                  <a:tcPr/>
                 </a:tc>
                 <a:tc vMerge="1">
                   <a:txBody>
@@ -4694,7 +4954,7 @@
                 </a:tc>
                 <a:extLst>
                   <a:ext uri="{0D108BD9-81ED-4DB2-BD59-A6C34878D82A}">
-                    <a16:rowId xmlns:a16="http://schemas.microsoft.com/office/drawing/2014/main" val="1678056918"/>
+                    <a16:rowId xmlns:a16="http://schemas.microsoft.com/office/drawing/2014/main" val="29736398"/>
                   </a:ext>
                 </a:extLst>
               </a:tr>

</xml_diff>

<commit_message>
road map status updated
</commit_message>
<xml_diff>
--- a/ROADMAP/roadmap html.pptx
+++ b/ROADMAP/roadmap html.pptx
@@ -3914,7 +3914,7 @@
             <p:ph idx="1"/>
             <p:extLst>
               <p:ext uri="{D42A27DB-BD31-4B8C-83A1-F6EECF244321}">
-                <p14:modId xmlns:p14="http://schemas.microsoft.com/office/powerpoint/2010/main" val="161196128"/>
+                <p14:modId xmlns:p14="http://schemas.microsoft.com/office/powerpoint/2010/main" val="1450950445"/>
               </p:ext>
             </p:extLst>
           </p:nvPr>
@@ -4082,12 +4082,12 @@
                     <a:p>
                       <a:pPr algn="ctr" fontAlgn="ctr"/>
                       <a:r>
-                        <a:rPr lang="en-IN" sz="900" u="none" strike="noStrike">
+                        <a:rPr lang="en-IN" sz="900" u="none" strike="noStrike" dirty="0">
                           <a:effectLst/>
                         </a:rPr>
                         <a:t>DONE</a:t>
                       </a:r>
-                      <a:endParaRPr lang="en-IN" sz="900" b="0" i="0" u="none" strike="noStrike">
+                      <a:endParaRPr lang="en-IN" sz="900" b="0" i="0" u="none" strike="noStrike" dirty="0">
                         <a:solidFill>
                           <a:srgbClr val="000000"/>
                         </a:solidFill>
@@ -4311,9 +4311,9 @@
                         <a:rPr lang="en-IN" sz="900" u="none" strike="noStrike">
                           <a:effectLst/>
                         </a:rPr>
-                        <a:t> </a:t>
+                        <a:t>DONE </a:t>
                       </a:r>
-                      <a:endParaRPr lang="en-IN" sz="900" b="0" i="0" u="none" strike="noStrike">
+                      <a:endParaRPr lang="en-IN" sz="900" b="0" i="0" u="none" strike="noStrike" dirty="0">
                         <a:solidFill>
                           <a:srgbClr val="000000"/>
                         </a:solidFill>

</xml_diff>

<commit_message>
format,links and images in html done
</commit_message>
<xml_diff>
--- a/ROADMAP/roadmap html.pptx
+++ b/ROADMAP/roadmap html.pptx
@@ -262,7 +262,7 @@
           <a:p>
             <a:fld id="{3757B9D6-B1DD-42FC-8CF6-CEEED335747B}" type="datetimeFigureOut">
               <a:rPr lang="en-IN" smtClean="0"/>
-              <a:t>09-09-2025</a:t>
+              <a:t>11-09-2025</a:t>
             </a:fld>
             <a:endParaRPr lang="en-IN"/>
           </a:p>
@@ -462,7 +462,7 @@
           <a:p>
             <a:fld id="{3757B9D6-B1DD-42FC-8CF6-CEEED335747B}" type="datetimeFigureOut">
               <a:rPr lang="en-IN" smtClean="0"/>
-              <a:t>09-09-2025</a:t>
+              <a:t>11-09-2025</a:t>
             </a:fld>
             <a:endParaRPr lang="en-IN"/>
           </a:p>
@@ -672,7 +672,7 @@
           <a:p>
             <a:fld id="{3757B9D6-B1DD-42FC-8CF6-CEEED335747B}" type="datetimeFigureOut">
               <a:rPr lang="en-IN" smtClean="0"/>
-              <a:t>09-09-2025</a:t>
+              <a:t>11-09-2025</a:t>
             </a:fld>
             <a:endParaRPr lang="en-IN"/>
           </a:p>
@@ -872,7 +872,7 @@
           <a:p>
             <a:fld id="{3757B9D6-B1DD-42FC-8CF6-CEEED335747B}" type="datetimeFigureOut">
               <a:rPr lang="en-IN" smtClean="0"/>
-              <a:t>09-09-2025</a:t>
+              <a:t>11-09-2025</a:t>
             </a:fld>
             <a:endParaRPr lang="en-IN"/>
           </a:p>
@@ -1148,7 +1148,7 @@
           <a:p>
             <a:fld id="{3757B9D6-B1DD-42FC-8CF6-CEEED335747B}" type="datetimeFigureOut">
               <a:rPr lang="en-IN" smtClean="0"/>
-              <a:t>09-09-2025</a:t>
+              <a:t>11-09-2025</a:t>
             </a:fld>
             <a:endParaRPr lang="en-IN"/>
           </a:p>
@@ -1416,7 +1416,7 @@
           <a:p>
             <a:fld id="{3757B9D6-B1DD-42FC-8CF6-CEEED335747B}" type="datetimeFigureOut">
               <a:rPr lang="en-IN" smtClean="0"/>
-              <a:t>09-09-2025</a:t>
+              <a:t>11-09-2025</a:t>
             </a:fld>
             <a:endParaRPr lang="en-IN"/>
           </a:p>
@@ -1831,7 +1831,7 @@
           <a:p>
             <a:fld id="{3757B9D6-B1DD-42FC-8CF6-CEEED335747B}" type="datetimeFigureOut">
               <a:rPr lang="en-IN" smtClean="0"/>
-              <a:t>09-09-2025</a:t>
+              <a:t>11-09-2025</a:t>
             </a:fld>
             <a:endParaRPr lang="en-IN"/>
           </a:p>
@@ -1973,7 +1973,7 @@
           <a:p>
             <a:fld id="{3757B9D6-B1DD-42FC-8CF6-CEEED335747B}" type="datetimeFigureOut">
               <a:rPr lang="en-IN" smtClean="0"/>
-              <a:t>09-09-2025</a:t>
+              <a:t>11-09-2025</a:t>
             </a:fld>
             <a:endParaRPr lang="en-IN"/>
           </a:p>
@@ -2086,7 +2086,7 @@
           <a:p>
             <a:fld id="{3757B9D6-B1DD-42FC-8CF6-CEEED335747B}" type="datetimeFigureOut">
               <a:rPr lang="en-IN" smtClean="0"/>
-              <a:t>09-09-2025</a:t>
+              <a:t>11-09-2025</a:t>
             </a:fld>
             <a:endParaRPr lang="en-IN"/>
           </a:p>
@@ -2399,7 +2399,7 @@
           <a:p>
             <a:fld id="{3757B9D6-B1DD-42FC-8CF6-CEEED335747B}" type="datetimeFigureOut">
               <a:rPr lang="en-IN" smtClean="0"/>
-              <a:t>09-09-2025</a:t>
+              <a:t>11-09-2025</a:t>
             </a:fld>
             <a:endParaRPr lang="en-IN"/>
           </a:p>
@@ -2688,7 +2688,7 @@
           <a:p>
             <a:fld id="{3757B9D6-B1DD-42FC-8CF6-CEEED335747B}" type="datetimeFigureOut">
               <a:rPr lang="en-IN" smtClean="0"/>
-              <a:t>09-09-2025</a:t>
+              <a:t>11-09-2025</a:t>
             </a:fld>
             <a:endParaRPr lang="en-IN"/>
           </a:p>
@@ -2931,7 +2931,7 @@
           <a:p>
             <a:fld id="{3757B9D6-B1DD-42FC-8CF6-CEEED335747B}" type="datetimeFigureOut">
               <a:rPr lang="en-IN" smtClean="0"/>
-              <a:t>09-09-2025</a:t>
+              <a:t>11-09-2025</a:t>
             </a:fld>
             <a:endParaRPr lang="en-IN"/>
           </a:p>
@@ -3914,7 +3914,7 @@
             <p:ph idx="1"/>
             <p:extLst>
               <p:ext uri="{D42A27DB-BD31-4B8C-83A1-F6EECF244321}">
-                <p14:modId xmlns:p14="http://schemas.microsoft.com/office/powerpoint/2010/main" val="1450950445"/>
+                <p14:modId xmlns:p14="http://schemas.microsoft.com/office/powerpoint/2010/main" val="2877030369"/>
               </p:ext>
             </p:extLst>
           </p:nvPr>
@@ -4434,12 +4434,12 @@
                     <a:p>
                       <a:pPr algn="ctr" fontAlgn="ctr"/>
                       <a:r>
-                        <a:rPr lang="en-IN" sz="900" u="none" strike="noStrike">
+                        <a:rPr lang="en-IN" sz="900" u="none" strike="noStrike" dirty="0">
                           <a:effectLst/>
                         </a:rPr>
-                        <a:t> </a:t>
+                        <a:t> DONE</a:t>
                       </a:r>
-                      <a:endParaRPr lang="en-IN" sz="900" b="0" i="0" u="none" strike="noStrike">
+                      <a:endParaRPr lang="en-IN" sz="900" b="0" i="0" u="none" strike="noStrike" dirty="0">
                         <a:solidFill>
                           <a:srgbClr val="000000"/>
                         </a:solidFill>

</xml_diff>

<commit_message>
all files pushed and roadmap updated
</commit_message>
<xml_diff>
--- a/ROADMAP/roadmap html.pptx
+++ b/ROADMAP/roadmap html.pptx
@@ -262,7 +262,7 @@
           <a:p>
             <a:fld id="{3757B9D6-B1DD-42FC-8CF6-CEEED335747B}" type="datetimeFigureOut">
               <a:rPr lang="en-IN" smtClean="0"/>
-              <a:t>11-09-2025</a:t>
+              <a:t>17-09-2025</a:t>
             </a:fld>
             <a:endParaRPr lang="en-IN"/>
           </a:p>
@@ -462,7 +462,7 @@
           <a:p>
             <a:fld id="{3757B9D6-B1DD-42FC-8CF6-CEEED335747B}" type="datetimeFigureOut">
               <a:rPr lang="en-IN" smtClean="0"/>
-              <a:t>11-09-2025</a:t>
+              <a:t>17-09-2025</a:t>
             </a:fld>
             <a:endParaRPr lang="en-IN"/>
           </a:p>
@@ -672,7 +672,7 @@
           <a:p>
             <a:fld id="{3757B9D6-B1DD-42FC-8CF6-CEEED335747B}" type="datetimeFigureOut">
               <a:rPr lang="en-IN" smtClean="0"/>
-              <a:t>11-09-2025</a:t>
+              <a:t>17-09-2025</a:t>
             </a:fld>
             <a:endParaRPr lang="en-IN"/>
           </a:p>
@@ -872,7 +872,7 @@
           <a:p>
             <a:fld id="{3757B9D6-B1DD-42FC-8CF6-CEEED335747B}" type="datetimeFigureOut">
               <a:rPr lang="en-IN" smtClean="0"/>
-              <a:t>11-09-2025</a:t>
+              <a:t>17-09-2025</a:t>
             </a:fld>
             <a:endParaRPr lang="en-IN"/>
           </a:p>
@@ -1148,7 +1148,7 @@
           <a:p>
             <a:fld id="{3757B9D6-B1DD-42FC-8CF6-CEEED335747B}" type="datetimeFigureOut">
               <a:rPr lang="en-IN" smtClean="0"/>
-              <a:t>11-09-2025</a:t>
+              <a:t>17-09-2025</a:t>
             </a:fld>
             <a:endParaRPr lang="en-IN"/>
           </a:p>
@@ -1416,7 +1416,7 @@
           <a:p>
             <a:fld id="{3757B9D6-B1DD-42FC-8CF6-CEEED335747B}" type="datetimeFigureOut">
               <a:rPr lang="en-IN" smtClean="0"/>
-              <a:t>11-09-2025</a:t>
+              <a:t>17-09-2025</a:t>
             </a:fld>
             <a:endParaRPr lang="en-IN"/>
           </a:p>
@@ -1831,7 +1831,7 @@
           <a:p>
             <a:fld id="{3757B9D6-B1DD-42FC-8CF6-CEEED335747B}" type="datetimeFigureOut">
               <a:rPr lang="en-IN" smtClean="0"/>
-              <a:t>11-09-2025</a:t>
+              <a:t>17-09-2025</a:t>
             </a:fld>
             <a:endParaRPr lang="en-IN"/>
           </a:p>
@@ -1973,7 +1973,7 @@
           <a:p>
             <a:fld id="{3757B9D6-B1DD-42FC-8CF6-CEEED335747B}" type="datetimeFigureOut">
               <a:rPr lang="en-IN" smtClean="0"/>
-              <a:t>11-09-2025</a:t>
+              <a:t>17-09-2025</a:t>
             </a:fld>
             <a:endParaRPr lang="en-IN"/>
           </a:p>
@@ -2086,7 +2086,7 @@
           <a:p>
             <a:fld id="{3757B9D6-B1DD-42FC-8CF6-CEEED335747B}" type="datetimeFigureOut">
               <a:rPr lang="en-IN" smtClean="0"/>
-              <a:t>11-09-2025</a:t>
+              <a:t>17-09-2025</a:t>
             </a:fld>
             <a:endParaRPr lang="en-IN"/>
           </a:p>
@@ -2399,7 +2399,7 @@
           <a:p>
             <a:fld id="{3757B9D6-B1DD-42FC-8CF6-CEEED335747B}" type="datetimeFigureOut">
               <a:rPr lang="en-IN" smtClean="0"/>
-              <a:t>11-09-2025</a:t>
+              <a:t>17-09-2025</a:t>
             </a:fld>
             <a:endParaRPr lang="en-IN"/>
           </a:p>
@@ -2688,7 +2688,7 @@
           <a:p>
             <a:fld id="{3757B9D6-B1DD-42FC-8CF6-CEEED335747B}" type="datetimeFigureOut">
               <a:rPr lang="en-IN" smtClean="0"/>
-              <a:t>11-09-2025</a:t>
+              <a:t>17-09-2025</a:t>
             </a:fld>
             <a:endParaRPr lang="en-IN"/>
           </a:p>
@@ -2931,7 +2931,7 @@
           <a:p>
             <a:fld id="{3757B9D6-B1DD-42FC-8CF6-CEEED335747B}" type="datetimeFigureOut">
               <a:rPr lang="en-IN" smtClean="0"/>
-              <a:t>11-09-2025</a:t>
+              <a:t>17-09-2025</a:t>
             </a:fld>
             <a:endParaRPr lang="en-IN"/>
           </a:p>
@@ -3914,7 +3914,7 @@
             <p:ph idx="1"/>
             <p:extLst>
               <p:ext uri="{D42A27DB-BD31-4B8C-83A1-F6EECF244321}">
-                <p14:modId xmlns:p14="http://schemas.microsoft.com/office/powerpoint/2010/main" val="2877030369"/>
+                <p14:modId xmlns:p14="http://schemas.microsoft.com/office/powerpoint/2010/main" val="3340772783"/>
               </p:ext>
             </p:extLst>
           </p:nvPr>
@@ -4613,7 +4613,7 @@
                         <a:rPr lang="en-IN" sz="900" u="none" strike="noStrike">
                           <a:effectLst/>
                         </a:rPr>
-                        <a:t> </a:t>
+                        <a:t>DONE </a:t>
                       </a:r>
                       <a:endParaRPr lang="en-IN" sz="900" b="0" i="0" u="none" strike="noStrike">
                         <a:solidFill>
@@ -4786,12 +4786,12 @@
                     <a:p>
                       <a:pPr algn="ctr" fontAlgn="ctr"/>
                       <a:r>
-                        <a:rPr lang="en-IN" sz="900" u="none" strike="noStrike">
+                        <a:rPr lang="en-IN" sz="900" u="none" strike="noStrike" dirty="0">
                           <a:effectLst/>
                         </a:rPr>
-                        <a:t> </a:t>
+                        <a:t>DONE </a:t>
                       </a:r>
-                      <a:endParaRPr lang="en-IN" sz="900" b="0" i="0" u="none" strike="noStrike">
+                      <a:endParaRPr lang="en-IN" sz="900" b="0" i="0" u="none" strike="noStrike" dirty="0">
                         <a:solidFill>
                           <a:srgbClr val="000000"/>
                         </a:solidFill>

</xml_diff>

<commit_message>
roadmap for css updated
</commit_message>
<xml_diff>
--- a/ROADMAP/roadmap html.pptx
+++ b/ROADMAP/roadmap html.pptx
@@ -262,7 +262,7 @@
           <a:p>
             <a:fld id="{3757B9D6-B1DD-42FC-8CF6-CEEED335747B}" type="datetimeFigureOut">
               <a:rPr lang="en-IN" smtClean="0"/>
-              <a:t>17-09-2025</a:t>
+              <a:t>15-10-2025</a:t>
             </a:fld>
             <a:endParaRPr lang="en-IN"/>
           </a:p>
@@ -462,7 +462,7 @@
           <a:p>
             <a:fld id="{3757B9D6-B1DD-42FC-8CF6-CEEED335747B}" type="datetimeFigureOut">
               <a:rPr lang="en-IN" smtClean="0"/>
-              <a:t>17-09-2025</a:t>
+              <a:t>15-10-2025</a:t>
             </a:fld>
             <a:endParaRPr lang="en-IN"/>
           </a:p>
@@ -672,7 +672,7 @@
           <a:p>
             <a:fld id="{3757B9D6-B1DD-42FC-8CF6-CEEED335747B}" type="datetimeFigureOut">
               <a:rPr lang="en-IN" smtClean="0"/>
-              <a:t>17-09-2025</a:t>
+              <a:t>15-10-2025</a:t>
             </a:fld>
             <a:endParaRPr lang="en-IN"/>
           </a:p>
@@ -872,7 +872,7 @@
           <a:p>
             <a:fld id="{3757B9D6-B1DD-42FC-8CF6-CEEED335747B}" type="datetimeFigureOut">
               <a:rPr lang="en-IN" smtClean="0"/>
-              <a:t>17-09-2025</a:t>
+              <a:t>15-10-2025</a:t>
             </a:fld>
             <a:endParaRPr lang="en-IN"/>
           </a:p>
@@ -1148,7 +1148,7 @@
           <a:p>
             <a:fld id="{3757B9D6-B1DD-42FC-8CF6-CEEED335747B}" type="datetimeFigureOut">
               <a:rPr lang="en-IN" smtClean="0"/>
-              <a:t>17-09-2025</a:t>
+              <a:t>15-10-2025</a:t>
             </a:fld>
             <a:endParaRPr lang="en-IN"/>
           </a:p>
@@ -1416,7 +1416,7 @@
           <a:p>
             <a:fld id="{3757B9D6-B1DD-42FC-8CF6-CEEED335747B}" type="datetimeFigureOut">
               <a:rPr lang="en-IN" smtClean="0"/>
-              <a:t>17-09-2025</a:t>
+              <a:t>15-10-2025</a:t>
             </a:fld>
             <a:endParaRPr lang="en-IN"/>
           </a:p>
@@ -1831,7 +1831,7 @@
           <a:p>
             <a:fld id="{3757B9D6-B1DD-42FC-8CF6-CEEED335747B}" type="datetimeFigureOut">
               <a:rPr lang="en-IN" smtClean="0"/>
-              <a:t>17-09-2025</a:t>
+              <a:t>15-10-2025</a:t>
             </a:fld>
             <a:endParaRPr lang="en-IN"/>
           </a:p>
@@ -1973,7 +1973,7 @@
           <a:p>
             <a:fld id="{3757B9D6-B1DD-42FC-8CF6-CEEED335747B}" type="datetimeFigureOut">
               <a:rPr lang="en-IN" smtClean="0"/>
-              <a:t>17-09-2025</a:t>
+              <a:t>15-10-2025</a:t>
             </a:fld>
             <a:endParaRPr lang="en-IN"/>
           </a:p>
@@ -2086,7 +2086,7 @@
           <a:p>
             <a:fld id="{3757B9D6-B1DD-42FC-8CF6-CEEED335747B}" type="datetimeFigureOut">
               <a:rPr lang="en-IN" smtClean="0"/>
-              <a:t>17-09-2025</a:t>
+              <a:t>15-10-2025</a:t>
             </a:fld>
             <a:endParaRPr lang="en-IN"/>
           </a:p>
@@ -2399,7 +2399,7 @@
           <a:p>
             <a:fld id="{3757B9D6-B1DD-42FC-8CF6-CEEED335747B}" type="datetimeFigureOut">
               <a:rPr lang="en-IN" smtClean="0"/>
-              <a:t>17-09-2025</a:t>
+              <a:t>15-10-2025</a:t>
             </a:fld>
             <a:endParaRPr lang="en-IN"/>
           </a:p>
@@ -2688,7 +2688,7 @@
           <a:p>
             <a:fld id="{3757B9D6-B1DD-42FC-8CF6-CEEED335747B}" type="datetimeFigureOut">
               <a:rPr lang="en-IN" smtClean="0"/>
-              <a:t>17-09-2025</a:t>
+              <a:t>15-10-2025</a:t>
             </a:fld>
             <a:endParaRPr lang="en-IN"/>
           </a:p>
@@ -2931,7 +2931,7 @@
           <a:p>
             <a:fld id="{3757B9D6-B1DD-42FC-8CF6-CEEED335747B}" type="datetimeFigureOut">
               <a:rPr lang="en-IN" smtClean="0"/>
-              <a:t>17-09-2025</a:t>
+              <a:t>15-10-2025</a:t>
             </a:fld>
             <a:endParaRPr lang="en-IN"/>
           </a:p>

</xml_diff>